<commit_message>
Minor fix to deliverable, Trung
</commit_message>
<xml_diff>
--- a/Presentation Slides/TrungNgoFinalPresentaion.pptx
+++ b/Presentation Slides/TrungNgoFinalPresentaion.pptx
@@ -4189,16 +4189,20 @@
           </a:p>
           <a:p>
             <a:r>
+              <a:rPr lang="en-US" smtClean="0"/>
+              <a:t>Daniel </a:t>
+            </a:r>
+            <a:r>
+              <a:rPr lang="en-US" smtClean="0"/>
+              <a:t>Gonzalez </a:t>
+            </a:r>
+            <a:r>
               <a:rPr lang="en-US" dirty="0" smtClean="0"/>
-              <a:t>Daniel </a:t>
-            </a:r>
-            <a:r>
-              <a:rPr lang="en-US" dirty="0" err="1" smtClean="0"/>
-              <a:t>Costaesa</a:t>
+              <a:t>, </a:t>
             </a:r>
             <a:r>
               <a:rPr lang="en-US" dirty="0" smtClean="0"/>
-              <a:t>, Developer</a:t>
+              <a:t>Developer</a:t>
             </a:r>
           </a:p>
           <a:p>

</xml_diff>